<commit_message>
Fixed spelling mistakes in documentation and presentation
</commit_message>
<xml_diff>
--- a/Documentation/Abschlusspräsentation Gruppe_4.pptx
+++ b/Documentation/Abschlusspräsentation Gruppe_4.pptx
@@ -1739,13 +1739,6 @@
   <p:clrMapOvr>
     <a:masterClrMapping/>
   </p:clrMapOvr>
-  <p:timing>
-    <p:tnLst>
-      <p:par>
-        <p:cTn id="1" dur="indefinite" restart="never" nodeType="tmRoot"/>
-      </p:par>
-    </p:tnLst>
-  </p:timing>
 </p:sldLayout>
 </file>
 
@@ -2030,13 +2023,6 @@
   <p:clrMapOvr>
     <a:masterClrMapping/>
   </p:clrMapOvr>
-  <p:timing>
-    <p:tnLst>
-      <p:par>
-        <p:cTn id="1" dur="indefinite" restart="never" nodeType="tmRoot"/>
-      </p:par>
-    </p:tnLst>
-  </p:timing>
 </p:sldLayout>
 </file>
 
@@ -2174,13 +2160,6 @@
   <p:clrMapOvr>
     <a:masterClrMapping/>
   </p:clrMapOvr>
-  <p:timing>
-    <p:tnLst>
-      <p:par>
-        <p:cTn id="1" dur="indefinite" restart="never" nodeType="tmRoot"/>
-      </p:par>
-    </p:tnLst>
-  </p:timing>
 </p:sldLayout>
 </file>
 
@@ -2340,13 +2319,6 @@
   <p:clrMapOvr>
     <a:masterClrMapping/>
   </p:clrMapOvr>
-  <p:timing>
-    <p:tnLst>
-      <p:par>
-        <p:cTn id="1" dur="indefinite" restart="never" nodeType="tmRoot"/>
-      </p:par>
-    </p:tnLst>
-  </p:timing>
 </p:sldLayout>
 </file>
 
@@ -2602,13 +2574,6 @@
   <p:clrMapOvr>
     <a:masterClrMapping/>
   </p:clrMapOvr>
-  <p:timing>
-    <p:tnLst>
-      <p:par>
-        <p:cTn id="1" dur="indefinite" restart="never" nodeType="tmRoot"/>
-      </p:par>
-    </p:tnLst>
-  </p:timing>
 </p:sldLayout>
 </file>
 
@@ -4499,13 +4464,6 @@
     <p:sldLayoutId id="2147483705" r:id="rId10"/>
     <p:sldLayoutId id="2147483706" r:id="rId11"/>
   </p:sldLayoutIdLst>
-  <p:timing>
-    <p:tnLst>
-      <p:par>
-        <p:cTn id="1" dur="indefinite" restart="never" nodeType="tmRoot"/>
-      </p:par>
-    </p:tnLst>
-  </p:timing>
   <p:hf hdr="0"/>
   <p:txStyles>
     <p:titleStyle>
@@ -5360,13 +5318,6 @@
   <p:clrMapOvr>
     <a:masterClrMapping/>
   </p:clrMapOvr>
-  <p:timing>
-    <p:tnLst>
-      <p:par>
-        <p:cTn id="1" dur="indefinite" restart="never" nodeType="tmRoot"/>
-      </p:par>
-    </p:tnLst>
-  </p:timing>
 </p:sld>
 </file>
 
@@ -5491,13 +5442,6 @@
   <p:clrMapOvr>
     <a:masterClrMapping/>
   </p:clrMapOvr>
-  <p:timing>
-    <p:tnLst>
-      <p:par>
-        <p:cTn id="1" dur="indefinite" restart="never" nodeType="tmRoot"/>
-      </p:par>
-    </p:tnLst>
-  </p:timing>
 </p:sld>
 </file>
 
@@ -5635,11 +5579,7 @@
             <a:pPr lvl="1"/>
             <a:r>
               <a:rPr lang="de-DE" dirty="0" smtClean="0"/>
-              <a:t>Preisakzeptanz zwischen 4 – 10 </a:t>
-            </a:r>
-            <a:r>
-              <a:rPr lang="de-DE" dirty="0" smtClean="0"/>
-              <a:t>€ </a:t>
+              <a:t>Preisakzeptanz zwischen 4 – 10 € </a:t>
             </a:r>
           </a:p>
           <a:p>
@@ -5648,7 +5588,6 @@
               <a:rPr lang="de-DE" dirty="0" smtClean="0"/>
               <a:t>Prototyp inkl. Basisstation liegt bei ca. 60 €</a:t>
             </a:r>
-            <a:endParaRPr lang="de-DE" dirty="0" smtClean="0"/>
           </a:p>
           <a:p>
             <a:pPr lvl="1"/>
@@ -5695,13 +5634,6 @@
   <p:clrMapOvr>
     <a:masterClrMapping/>
   </p:clrMapOvr>
-  <p:timing>
-    <p:tnLst>
-      <p:par>
-        <p:cTn id="1" dur="indefinite" restart="never" nodeType="tmRoot"/>
-      </p:par>
-    </p:tnLst>
-  </p:timing>
 </p:sld>
 </file>
 
@@ -6075,12 +6007,12 @@
               <a:t>Benutzerfreundlichkeit: </a:t>
             </a:r>
             <a:r>
-              <a:rPr lang="de-DE" dirty="0" err="1" smtClean="0">
+              <a:rPr lang="de-DE" dirty="0" smtClean="0">
                 <a:solidFill>
                   <a:srgbClr val="FF0000"/>
                 </a:solidFill>
               </a:rPr>
-              <a:t>Baterieanzeige</a:t>
+              <a:t>Batterieanzeige</a:t>
             </a:r>
             <a:r>
               <a:rPr lang="de-DE" dirty="0" smtClean="0">
@@ -6109,7 +6041,7 @@
               <a:t>Sonstiges: Kalibrierung, Vorhersagen</a:t>
             </a:r>
             <a:r>
-              <a:rPr lang="de-DE" dirty="0" smtClean="0">
+              <a:rPr lang="de-DE" smtClean="0">
                 <a:solidFill>
                   <a:srgbClr val="FF0000"/>
                 </a:solidFill>
@@ -6117,36 +6049,22 @@
               <a:t>,</a:t>
             </a:r>
             <a:r>
-              <a:rPr lang="de-DE" dirty="0" smtClean="0"/>
+              <a:rPr lang="de-DE" smtClean="0"/>
               <a:t> </a:t>
             </a:r>
             <a:r>
-              <a:rPr lang="de-DE" dirty="0" smtClean="0">
+              <a:rPr lang="de-DE" smtClean="0">
                 <a:solidFill>
                   <a:srgbClr val="FF0000"/>
                 </a:solidFill>
               </a:rPr>
-              <a:t>Regensensor (</a:t>
-            </a:r>
-            <a:r>
-              <a:rPr lang="de-DE" dirty="0" err="1" smtClean="0">
-                <a:solidFill>
-                  <a:srgbClr val="FF0000"/>
-                </a:solidFill>
-              </a:rPr>
-              <a:t>MultiUserSupport</a:t>
-            </a:r>
-            <a:r>
-              <a:rPr lang="de-DE" dirty="0" smtClean="0">
-                <a:solidFill>
-                  <a:srgbClr val="FF0000"/>
-                </a:solidFill>
-              </a:rPr>
-              <a:t>)</a:t>
-            </a:r>
-          </a:p>
-          <a:p>
-            <a:pPr lvl="1"/>
+              <a:t>Regensensor</a:t>
+            </a:r>
+          </a:p>
+          <a:p>
+            <a:pPr marL="476250" lvl="1" indent="0">
+              <a:buNone/>
+            </a:pPr>
             <a:endParaRPr lang="de-DE" dirty="0" smtClean="0"/>
           </a:p>
           <a:p>
@@ -6283,13 +6201,6 @@
   <p:clrMapOvr>
     <a:masterClrMapping/>
   </p:clrMapOvr>
-  <p:timing>
-    <p:tnLst>
-      <p:par>
-        <p:cTn id="1" dur="indefinite" restart="never" nodeType="tmRoot"/>
-      </p:par>
-    </p:tnLst>
-  </p:timing>
 </p:sld>
 </file>
 
@@ -6431,13 +6342,6 @@
   <p:clrMapOvr>
     <a:masterClrMapping/>
   </p:clrMapOvr>
-  <p:timing>
-    <p:tnLst>
-      <p:par>
-        <p:cTn id="1" dur="indefinite" restart="never" nodeType="tmRoot"/>
-      </p:par>
-    </p:tnLst>
-  </p:timing>
 </p:sld>
 </file>
 
@@ -6524,13 +6428,6 @@
   <p:clrMapOvr>
     <a:masterClrMapping/>
   </p:clrMapOvr>
-  <p:timing>
-    <p:tnLst>
-      <p:par>
-        <p:cTn id="1" dur="indefinite" restart="never" nodeType="tmRoot"/>
-      </p:par>
-    </p:tnLst>
-  </p:timing>
 </p:sld>
 </file>
 

</xml_diff>